<commit_message>
Replace tab by space as intended
</commit_message>
<xml_diff>
--- a/Repro/Test1/Resources/example.pptx
+++ b/Repro/Test1/Resources/example.pptx
@@ -104,6 +104,11 @@
       </a:defRPr>
     </a:lvl9pPr>
   </p:defaultTextStyle>
+  <p:extLst>
+    <p:ext uri="{EFAFB233-063F-42B5-8137-9DF3F51BA10A}">
+      <p15:sldGuideLst xmlns:p15="http://schemas.microsoft.com/office/powerpoint/2012/main"/>
+    </p:ext>
+  </p:extLst>
 </p:presentation>
 </file>
 
@@ -3351,7 +3356,7 @@
           <a:p>
             <a:r>
               <a:rPr lang="de-DE" dirty="0"/>
-              <a:t>	</a:t>
+              <a:t> </a:t>
             </a:r>
             <a:r>
               <a:rPr lang="de-DE" dirty="0">

</xml_diff>